<commit_message>
Adding ending feedback to last slide
</commit_message>
<xml_diff>
--- a/Midterm_Project_update.pptx
+++ b/Midterm_Project_update.pptx
@@ -586,7 +586,7 @@
           <a:p>
             <a:fld id="{EA0C0817-A112-4847-8014-A94B7D2A4EA3}" type="datetime1">
               <a:rPr lang="en-US" smtClean="0"/>
-              <a:t>2/26/2020</a:t>
+              <a:t>2/27/2020</a:t>
             </a:fld>
             <a:endParaRPr lang="en-US" dirty="0"/>
           </a:p>
@@ -788,7 +788,7 @@
           <a:p>
             <a:fld id="{134F40B7-36AB-4376-BE14-EF7004D79BB9}" type="datetime1">
               <a:rPr lang="en-US" smtClean="0"/>
-              <a:t>2/26/2020</a:t>
+              <a:t>2/27/2020</a:t>
             </a:fld>
             <a:endParaRPr lang="en-US"/>
           </a:p>
@@ -968,7 +968,7 @@
           <a:p>
             <a:fld id="{FF87CAB8-DCAE-46A5-AADA-B3FAD11A54E0}" type="datetime1">
               <a:rPr lang="en-US" smtClean="0"/>
-              <a:t>2/26/2020</a:t>
+              <a:t>2/27/2020</a:t>
             </a:fld>
             <a:endParaRPr lang="en-US"/>
           </a:p>
@@ -1138,7 +1138,7 @@
           <a:p>
             <a:fld id="{7332B432-ACDA-4023-A761-2BAB76577B62}" type="datetime1">
               <a:rPr lang="en-US" smtClean="0"/>
-              <a:t>2/26/2020</a:t>
+              <a:t>2/27/2020</a:t>
             </a:fld>
             <a:endParaRPr lang="en-US"/>
           </a:p>
@@ -1737,7 +1737,7 @@
           <a:p>
             <a:fld id="{D9C646AA-F36E-4540-911D-FFFC0A0EF24A}" type="datetime1">
               <a:rPr lang="en-US" smtClean="0"/>
-              <a:t>2/26/2020</a:t>
+              <a:t>2/27/2020</a:t>
             </a:fld>
             <a:endParaRPr lang="en-US" dirty="0"/>
           </a:p>
@@ -2057,7 +2057,7 @@
           <a:p>
             <a:fld id="{69186D26-FA5F-4637-B602-B7C2DC34CFD4}" type="datetime1">
               <a:rPr lang="en-US" smtClean="0"/>
-              <a:t>2/26/2020</a:t>
+              <a:t>2/27/2020</a:t>
             </a:fld>
             <a:endParaRPr lang="en-US"/>
           </a:p>
@@ -2494,7 +2494,7 @@
           <a:p>
             <a:fld id="{8A7F15D8-96D1-4781-BC50-CA8A088B2FE4}" type="datetime1">
               <a:rPr lang="en-US" smtClean="0"/>
-              <a:t>2/26/2020</a:t>
+              <a:t>2/27/2020</a:t>
             </a:fld>
             <a:endParaRPr lang="en-US"/>
           </a:p>
@@ -2612,7 +2612,7 @@
           <a:p>
             <a:fld id="{F9A96C99-B8F8-4528-BD05-0E16E943DC09}" type="datetime1">
               <a:rPr lang="en-US" smtClean="0"/>
-              <a:t>2/26/2020</a:t>
+              <a:t>2/27/2020</a:t>
             </a:fld>
             <a:endParaRPr lang="en-US"/>
           </a:p>
@@ -2707,7 +2707,7 @@
           <a:p>
             <a:fld id="{03636942-C211-4B28-8DBD-C953E00AF71B}" type="datetime1">
               <a:rPr lang="en-US" smtClean="0"/>
-              <a:t>2/26/2020</a:t>
+              <a:t>2/27/2020</a:t>
             </a:fld>
             <a:endParaRPr lang="en-US"/>
           </a:p>
@@ -3124,7 +3124,7 @@
           <a:p>
             <a:fld id="{7E8D12A6-918A-48BD-8CB9-CA713993B0EA}" type="datetime1">
               <a:rPr lang="en-US" smtClean="0"/>
-              <a:t>2/26/2020</a:t>
+              <a:t>2/27/2020</a:t>
             </a:fld>
             <a:endParaRPr lang="en-US"/>
           </a:p>
@@ -3386,7 +3386,7 @@
             <a:fld id="{E778CE86-875F-4587-BCF6-FA054AFC0D53}" type="datetime1">
               <a:rPr lang="en-US" smtClean="0"/>
               <a:pPr/>
-              <a:t>2/26/2020</a:t>
+              <a:t>2/27/2020</a:t>
             </a:fld>
             <a:endParaRPr lang="en-US" dirty="0"/>
           </a:p>
@@ -3902,7 +3902,7 @@
           <a:p>
             <a:fld id="{F6FA2B21-3FCD-4721-B95C-427943F61125}" type="datetime1">
               <a:rPr lang="en-US" smtClean="0"/>
-              <a:t>2/26/2020</a:t>
+              <a:t>2/27/2020</a:t>
             </a:fld>
             <a:endParaRPr lang="en-US"/>
           </a:p>
@@ -5356,6 +5356,60 @@
             </a:r>
           </a:p>
           <a:p>
+            <a:pPr lvl="1"/>
+            <a:endParaRPr lang="en-US" sz="1400" dirty="0"/>
+          </a:p>
+          <a:p>
+            <a:pPr lvl="1"/>
+            <a:endParaRPr lang="en-US" sz="1400" dirty="0"/>
+          </a:p>
+          <a:p>
+            <a:pPr lvl="1"/>
+            <a:endParaRPr lang="en-US" sz="1400" dirty="0"/>
+          </a:p>
+          <a:p>
+            <a:pPr lvl="1"/>
+            <a:endParaRPr lang="en-US" sz="1400" dirty="0"/>
+          </a:p>
+          <a:p>
+            <a:r>
+              <a:rPr lang="en-US" sz="1600" dirty="0"/>
+              <a:t>Web audio for long run working out</a:t>
+            </a:r>
+          </a:p>
+          <a:p>
+            <a:r>
+              <a:rPr lang="en-US" sz="1600" dirty="0"/>
+              <a:t>STK might have pitch detection buried </a:t>
+            </a:r>
+            <a:r>
+              <a:rPr lang="en-US" sz="1600"/>
+              <a:t>in it</a:t>
+            </a:r>
+            <a:endParaRPr lang="en-US" sz="1600" dirty="0"/>
+          </a:p>
+          <a:p>
+            <a:r>
+              <a:rPr lang="en-US" sz="1600" dirty="0"/>
+              <a:t>Instead of midi bleeps in </a:t>
+            </a:r>
+            <a:r>
+              <a:rPr lang="en-US" sz="1600" dirty="0" err="1"/>
+              <a:t>bloops</a:t>
+            </a:r>
+            <a:r>
+              <a:rPr lang="en-US" sz="1600" dirty="0"/>
+              <a:t> have good way to export to common file type, music xml</a:t>
+            </a:r>
+          </a:p>
+          <a:p>
+            <a:pPr lvl="1"/>
+            <a:r>
+              <a:rPr lang="en-US" sz="1400" dirty="0"/>
+              <a:t>So that finale and sib can import it</a:t>
+            </a:r>
+          </a:p>
+          <a:p>
             <a:endParaRPr lang="en-US" dirty="0"/>
           </a:p>
         </p:txBody>

</xml_diff>